<commit_message>
Delete slide 27 and add group names
</commit_message>
<xml_diff>
--- a/Presentation.pptx
+++ b/Presentation.pptx
@@ -5,7 +5,7 @@
     <p:sldMasterId id="2147483659" r:id="rId1"/>
   </p:sldMasterIdLst>
   <p:notesMasterIdLst>
-    <p:notesMasterId r:id="rId34"/>
+    <p:notesMasterId r:id="rId33"/>
   </p:notesMasterIdLst>
   <p:sldIdLst>
     <p:sldId id="275" r:id="rId2"/>
@@ -34,21 +34,20 @@
     <p:sldId id="282" r:id="rId25"/>
     <p:sldId id="297" r:id="rId26"/>
     <p:sldId id="302" r:id="rId27"/>
-    <p:sldId id="298" r:id="rId28"/>
-    <p:sldId id="299" r:id="rId29"/>
-    <p:sldId id="300" r:id="rId30"/>
-    <p:sldId id="273" r:id="rId31"/>
-    <p:sldId id="301" r:id="rId32"/>
-    <p:sldId id="274" r:id="rId33"/>
+    <p:sldId id="299" r:id="rId28"/>
+    <p:sldId id="300" r:id="rId29"/>
+    <p:sldId id="273" r:id="rId30"/>
+    <p:sldId id="301" r:id="rId31"/>
+    <p:sldId id="274" r:id="rId32"/>
   </p:sldIdLst>
   <p:sldSz cx="9144000" cy="5143500" type="screen16x9"/>
   <p:notesSz cx="6858000" cy="9144000"/>
   <p:embeddedFontLst>
     <p:embeddedFont>
       <p:font typeface="Old Standard TT" panose="020B0604020202020204" charset="0"/>
-      <p:regular r:id="rId35"/>
-      <p:bold r:id="rId36"/>
-      <p:italic r:id="rId37"/>
+      <p:regular r:id="rId34"/>
+      <p:bold r:id="rId35"/>
+      <p:italic r:id="rId36"/>
     </p:embeddedFont>
   </p:embeddedFontLst>
   <p:defaultTextStyle>
@@ -10165,155 +10164,6 @@
 </file>
 
 <file path=ppt/slides/slide27.xml><?xml version="1.0" encoding="utf-8"?>
-<p:sld xmlns:a="http://schemas.openxmlformats.org/drawingml/2006/main" xmlns:r="http://schemas.openxmlformats.org/officeDocument/2006/relationships" xmlns:p="http://schemas.openxmlformats.org/presentationml/2006/main" show="0">
-  <p:cSld>
-    <p:spTree>
-      <p:nvGrpSpPr>
-        <p:cNvPr id="1" name=""/>
-        <p:cNvGrpSpPr/>
-        <p:nvPr/>
-      </p:nvGrpSpPr>
-      <p:grpSpPr>
-        <a:xfrm>
-          <a:off x="0" y="0"/>
-          <a:ext cx="0" cy="0"/>
-          <a:chOff x="0" y="0"/>
-          <a:chExt cx="0" cy="0"/>
-        </a:xfrm>
-      </p:grpSpPr>
-      <p:sp>
-        <p:nvSpPr>
-          <p:cNvPr id="2" name="Title 1">
-            <a:extLst>
-              <a:ext uri="{FF2B5EF4-FFF2-40B4-BE49-F238E27FC236}">
-                <a16:creationId xmlns:a16="http://schemas.microsoft.com/office/drawing/2014/main" id="{206A73ED-8D40-400D-8485-7BF705C35D03}"/>
-              </a:ext>
-            </a:extLst>
-          </p:cNvPr>
-          <p:cNvSpPr>
-            <a:spLocks noGrp="1"/>
-          </p:cNvSpPr>
-          <p:nvPr>
-            <p:ph type="title"/>
-          </p:nvPr>
-        </p:nvSpPr>
-        <p:spPr/>
-        <p:txBody>
-          <a:bodyPr/>
-          <a:lstStyle/>
-          <a:p>
-            <a:r>
-              <a:rPr lang="en-US" dirty="0"/>
-              <a:t>Global alignment (Contd.)</a:t>
-            </a:r>
-          </a:p>
-        </p:txBody>
-      </p:sp>
-      <p:sp>
-        <p:nvSpPr>
-          <p:cNvPr id="3" name="Text Placeholder 2">
-            <a:extLst>
-              <a:ext uri="{FF2B5EF4-FFF2-40B4-BE49-F238E27FC236}">
-                <a16:creationId xmlns:a16="http://schemas.microsoft.com/office/drawing/2014/main" id="{0986D137-775B-4A16-BCA8-F1B5BC45C7C1}"/>
-              </a:ext>
-            </a:extLst>
-          </p:cNvPr>
-          <p:cNvSpPr>
-            <a:spLocks noGrp="1"/>
-          </p:cNvSpPr>
-          <p:nvPr>
-            <p:ph type="body" idx="1"/>
-          </p:nvPr>
-        </p:nvSpPr>
-        <p:spPr/>
-        <p:txBody>
-          <a:bodyPr/>
-          <a:lstStyle/>
-          <a:p>
-            <a:pPr marL="114300" indent="0">
-              <a:buNone/>
-            </a:pPr>
-            <a:r>
-              <a:rPr lang="en-US" dirty="0"/>
-              <a:t>Sequence alignment result:</a:t>
-            </a:r>
-          </a:p>
-        </p:txBody>
-      </p:sp>
-      <p:pic>
-        <p:nvPicPr>
-          <p:cNvPr id="7" name="Picture 6" descr="Text&#10;&#10;Description automatically generated">
-            <a:extLst>
-              <a:ext uri="{FF2B5EF4-FFF2-40B4-BE49-F238E27FC236}">
-                <a16:creationId xmlns:a16="http://schemas.microsoft.com/office/drawing/2014/main" id="{1408D34B-E8DE-46F3-8B01-97E345DE6FF6}"/>
-              </a:ext>
-            </a:extLst>
-          </p:cNvPr>
-          <p:cNvPicPr>
-            <a:picLocks noChangeAspect="1"/>
-          </p:cNvPicPr>
-          <p:nvPr/>
-        </p:nvPicPr>
-        <p:blipFill>
-          <a:blip r:embed="rId2"/>
-          <a:stretch>
-            <a:fillRect/>
-          </a:stretch>
-        </p:blipFill>
-        <p:spPr>
-          <a:xfrm>
-            <a:off x="378871" y="1654024"/>
-            <a:ext cx="8230313" cy="3139712"/>
-          </a:xfrm>
-          <a:prstGeom prst="rect">
-            <a:avLst/>
-          </a:prstGeom>
-        </p:spPr>
-      </p:pic>
-      <p:pic>
-        <p:nvPicPr>
-          <p:cNvPr id="5" name="Picture 4">
-            <a:extLst>
-              <a:ext uri="{FF2B5EF4-FFF2-40B4-BE49-F238E27FC236}">
-                <a16:creationId xmlns:a16="http://schemas.microsoft.com/office/drawing/2014/main" id="{A42F92EE-91A7-430E-8583-4904DAAD2A53}"/>
-              </a:ext>
-            </a:extLst>
-          </p:cNvPr>
-          <p:cNvPicPr>
-            <a:picLocks noChangeAspect="1"/>
-          </p:cNvPicPr>
-          <p:nvPr/>
-        </p:nvPicPr>
-        <p:blipFill>
-          <a:blip r:embed="rId3"/>
-          <a:stretch>
-            <a:fillRect/>
-          </a:stretch>
-        </p:blipFill>
-        <p:spPr>
-          <a:xfrm>
-            <a:off x="1688014" y="824212"/>
-            <a:ext cx="5088804" cy="2911541"/>
-          </a:xfrm>
-          <a:prstGeom prst="rect">
-            <a:avLst/>
-          </a:prstGeom>
-        </p:spPr>
-      </p:pic>
-    </p:spTree>
-    <p:extLst>
-      <p:ext uri="{BB962C8B-B14F-4D97-AF65-F5344CB8AC3E}">
-        <p14:creationId xmlns:p14="http://schemas.microsoft.com/office/powerpoint/2010/main" val="2624945715"/>
-      </p:ext>
-    </p:extLst>
-  </p:cSld>
-  <p:clrMapOvr>
-    <a:masterClrMapping/>
-  </p:clrMapOvr>
-</p:sld>
-</file>
-
-<file path=ppt/slides/slide28.xml><?xml version="1.0" encoding="utf-8"?>
 <p:sld xmlns:a="http://schemas.openxmlformats.org/drawingml/2006/main" xmlns:r="http://schemas.openxmlformats.org/officeDocument/2006/relationships" xmlns:p="http://schemas.openxmlformats.org/presentationml/2006/main">
   <p:cSld>
     <p:spTree>
@@ -10443,7 +10293,7 @@
 </p:sld>
 </file>
 
-<file path=ppt/slides/slide29.xml><?xml version="1.0" encoding="utf-8"?>
+<file path=ppt/slides/slide28.xml><?xml version="1.0" encoding="utf-8"?>
 <p:sld xmlns:a="http://schemas.openxmlformats.org/drawingml/2006/main" xmlns:r="http://schemas.openxmlformats.org/officeDocument/2006/relationships" xmlns:p="http://schemas.openxmlformats.org/presentationml/2006/main">
   <p:cSld>
     <p:spTree>
@@ -10583,6 +10433,132 @@
         <p14:creationId xmlns:p14="http://schemas.microsoft.com/office/powerpoint/2010/main" val="3242178876"/>
       </p:ext>
     </p:extLst>
+  </p:cSld>
+  <p:clrMapOvr>
+    <a:masterClrMapping/>
+  </p:clrMapOvr>
+</p:sld>
+</file>
+
+<file path=ppt/slides/slide29.xml><?xml version="1.0" encoding="utf-8"?>
+<p:sld xmlns:a="http://schemas.openxmlformats.org/drawingml/2006/main" xmlns:r="http://schemas.openxmlformats.org/officeDocument/2006/relationships" xmlns:p="http://schemas.openxmlformats.org/presentationml/2006/main">
+  <p:cSld>
+    <p:spTree>
+      <p:nvGrpSpPr>
+        <p:cNvPr id="1" name="Shape 166"/>
+        <p:cNvGrpSpPr/>
+        <p:nvPr/>
+      </p:nvGrpSpPr>
+      <p:grpSpPr>
+        <a:xfrm>
+          <a:off x="0" y="0"/>
+          <a:ext cx="0" cy="0"/>
+          <a:chOff x="0" y="0"/>
+          <a:chExt cx="0" cy="0"/>
+        </a:xfrm>
+      </p:grpSpPr>
+      <p:sp>
+        <p:nvSpPr>
+          <p:cNvPr id="167" name="Google Shape;167;p30"/>
+          <p:cNvSpPr txBox="1">
+            <a:spLocks noGrp="1"/>
+          </p:cNvSpPr>
+          <p:nvPr>
+            <p:ph type="title"/>
+          </p:nvPr>
+        </p:nvSpPr>
+        <p:spPr>
+          <a:xfrm>
+            <a:off x="311700" y="445025"/>
+            <a:ext cx="8520600" cy="613200"/>
+          </a:xfrm>
+          <a:prstGeom prst="rect">
+            <a:avLst/>
+          </a:prstGeom>
+        </p:spPr>
+        <p:txBody>
+          <a:bodyPr spcFirstLastPara="1" wrap="square" lIns="91425" tIns="91425" rIns="91425" bIns="91425" anchor="t" anchorCtr="0">
+            <a:noAutofit/>
+          </a:bodyPr>
+          <a:lstStyle/>
+          <a:p>
+            <a:pPr marL="0" lvl="0" indent="0" algn="l" rtl="0">
+              <a:spcBef>
+                <a:spcPts val="0"/>
+              </a:spcBef>
+              <a:spcAft>
+                <a:spcPts val="0"/>
+              </a:spcAft>
+              <a:buNone/>
+            </a:pPr>
+            <a:r>
+              <a:rPr lang="en" sz="4000" dirty="0"/>
+              <a:t>Conclusion</a:t>
+            </a:r>
+            <a:endParaRPr sz="4000" dirty="0"/>
+          </a:p>
+        </p:txBody>
+      </p:sp>
+      <p:sp>
+        <p:nvSpPr>
+          <p:cNvPr id="168" name="Google Shape;168;p30"/>
+          <p:cNvSpPr txBox="1">
+            <a:spLocks noGrp="1"/>
+          </p:cNvSpPr>
+          <p:nvPr>
+            <p:ph type="body" idx="1"/>
+          </p:nvPr>
+        </p:nvSpPr>
+        <p:spPr>
+          <a:xfrm>
+            <a:off x="311700" y="1171600"/>
+            <a:ext cx="8520600" cy="3397200"/>
+          </a:xfrm>
+          <a:prstGeom prst="rect">
+            <a:avLst/>
+          </a:prstGeom>
+        </p:spPr>
+        <p:txBody>
+          <a:bodyPr spcFirstLastPara="1" wrap="square" lIns="91425" tIns="91425" rIns="91425" bIns="91425" anchor="t" anchorCtr="0">
+            <a:noAutofit/>
+          </a:bodyPr>
+          <a:lstStyle/>
+          <a:p>
+            <a:pPr marL="285750" indent="-285750"/>
+            <a:r>
+              <a:rPr lang="en-US" dirty="0"/>
+              <a:t>Sequence alignment is a way of arranging the sequences of DNA, RNA, or protein to identify regions of similarity that may be a consequence of functional, structural, or evolutionary relationships between the sequences.</a:t>
+            </a:r>
+          </a:p>
+          <a:p>
+            <a:pPr marL="285750" indent="-285750"/>
+            <a:r>
+              <a:rPr lang="en-US" dirty="0"/>
+              <a:t>Needleman-</a:t>
+            </a:r>
+            <a:r>
+              <a:rPr lang="en-US" dirty="0" err="1"/>
+              <a:t>wunsch</a:t>
+            </a:r>
+            <a:r>
+              <a:rPr lang="en-US" dirty="0"/>
+              <a:t> algorithm uses the global alignment technique. For this project, the global alignment algorithm has been implemented to compare nsp1 gene sequence alignment between SARS CoV2 and MERS.</a:t>
+            </a:r>
+          </a:p>
+          <a:p>
+            <a:pPr marL="285750" indent="-285750"/>
+            <a:r>
+              <a:rPr lang="en-US" dirty="0"/>
+              <a:t>BLAST(Basic Local Alignment Search Tool) uses smith-waterman algorithm (local alignment technique) to search high scoring sequence alignments between two or more sequences.</a:t>
+            </a:r>
+          </a:p>
+          <a:p>
+            <a:pPr marL="285750" indent="-285750"/>
+            <a:endParaRPr dirty="0"/>
+          </a:p>
+        </p:txBody>
+      </p:sp>
+    </p:spTree>
   </p:cSld>
   <p:clrMapOvr>
     <a:masterClrMapping/>
@@ -10681,132 +10657,6 @@
   <p:cSld>
     <p:spTree>
       <p:nvGrpSpPr>
-        <p:cNvPr id="1" name="Shape 166"/>
-        <p:cNvGrpSpPr/>
-        <p:nvPr/>
-      </p:nvGrpSpPr>
-      <p:grpSpPr>
-        <a:xfrm>
-          <a:off x="0" y="0"/>
-          <a:ext cx="0" cy="0"/>
-          <a:chOff x="0" y="0"/>
-          <a:chExt cx="0" cy="0"/>
-        </a:xfrm>
-      </p:grpSpPr>
-      <p:sp>
-        <p:nvSpPr>
-          <p:cNvPr id="167" name="Google Shape;167;p30"/>
-          <p:cNvSpPr txBox="1">
-            <a:spLocks noGrp="1"/>
-          </p:cNvSpPr>
-          <p:nvPr>
-            <p:ph type="title"/>
-          </p:nvPr>
-        </p:nvSpPr>
-        <p:spPr>
-          <a:xfrm>
-            <a:off x="311700" y="445025"/>
-            <a:ext cx="8520600" cy="613200"/>
-          </a:xfrm>
-          <a:prstGeom prst="rect">
-            <a:avLst/>
-          </a:prstGeom>
-        </p:spPr>
-        <p:txBody>
-          <a:bodyPr spcFirstLastPara="1" wrap="square" lIns="91425" tIns="91425" rIns="91425" bIns="91425" anchor="t" anchorCtr="0">
-            <a:noAutofit/>
-          </a:bodyPr>
-          <a:lstStyle/>
-          <a:p>
-            <a:pPr marL="0" lvl="0" indent="0" algn="l" rtl="0">
-              <a:spcBef>
-                <a:spcPts val="0"/>
-              </a:spcBef>
-              <a:spcAft>
-                <a:spcPts val="0"/>
-              </a:spcAft>
-              <a:buNone/>
-            </a:pPr>
-            <a:r>
-              <a:rPr lang="en" sz="4000" dirty="0"/>
-              <a:t>Conclusion</a:t>
-            </a:r>
-            <a:endParaRPr sz="4000" dirty="0"/>
-          </a:p>
-        </p:txBody>
-      </p:sp>
-      <p:sp>
-        <p:nvSpPr>
-          <p:cNvPr id="168" name="Google Shape;168;p30"/>
-          <p:cNvSpPr txBox="1">
-            <a:spLocks noGrp="1"/>
-          </p:cNvSpPr>
-          <p:nvPr>
-            <p:ph type="body" idx="1"/>
-          </p:nvPr>
-        </p:nvSpPr>
-        <p:spPr>
-          <a:xfrm>
-            <a:off x="311700" y="1171600"/>
-            <a:ext cx="8520600" cy="3397200"/>
-          </a:xfrm>
-          <a:prstGeom prst="rect">
-            <a:avLst/>
-          </a:prstGeom>
-        </p:spPr>
-        <p:txBody>
-          <a:bodyPr spcFirstLastPara="1" wrap="square" lIns="91425" tIns="91425" rIns="91425" bIns="91425" anchor="t" anchorCtr="0">
-            <a:noAutofit/>
-          </a:bodyPr>
-          <a:lstStyle/>
-          <a:p>
-            <a:pPr marL="285750" indent="-285750"/>
-            <a:r>
-              <a:rPr lang="en-US" dirty="0"/>
-              <a:t>Sequence alignment is a way of arranging the sequences of DNA, RNA, or protein to identify regions of similarity that may be a consequence of functional, structural, or evolutionary relationships between the sequences.</a:t>
-            </a:r>
-          </a:p>
-          <a:p>
-            <a:pPr marL="285750" indent="-285750"/>
-            <a:r>
-              <a:rPr lang="en-US" dirty="0"/>
-              <a:t>Needleman-</a:t>
-            </a:r>
-            <a:r>
-              <a:rPr lang="en-US" dirty="0" err="1"/>
-              <a:t>wunsch</a:t>
-            </a:r>
-            <a:r>
-              <a:rPr lang="en-US" dirty="0"/>
-              <a:t> algorithm uses the global alignment technique. For this project, the global alignment algorithm has been implemented to compare nsp1 gene sequence alignment between SARS CoV2 and MERS.</a:t>
-            </a:r>
-          </a:p>
-          <a:p>
-            <a:pPr marL="285750" indent="-285750"/>
-            <a:r>
-              <a:rPr lang="en-US" dirty="0"/>
-              <a:t>BLAST(Basic Local Alignment Search Tool) uses smith-waterman algorithm (local alignment technique) to search high scoring sequence alignments between two or more sequences.</a:t>
-            </a:r>
-          </a:p>
-          <a:p>
-            <a:pPr marL="285750" indent="-285750"/>
-            <a:endParaRPr dirty="0"/>
-          </a:p>
-        </p:txBody>
-      </p:sp>
-    </p:spTree>
-  </p:cSld>
-  <p:clrMapOvr>
-    <a:masterClrMapping/>
-  </p:clrMapOvr>
-</p:sld>
-</file>
-
-<file path=ppt/slides/slide31.xml><?xml version="1.0" encoding="utf-8"?>
-<p:sld xmlns:a="http://schemas.openxmlformats.org/drawingml/2006/main" xmlns:r="http://schemas.openxmlformats.org/officeDocument/2006/relationships" xmlns:p="http://schemas.openxmlformats.org/presentationml/2006/main">
-  <p:cSld>
-    <p:spTree>
-      <p:nvGrpSpPr>
         <p:cNvPr id="1" name=""/>
         <p:cNvGrpSpPr/>
         <p:nvPr/>
@@ -10925,7 +10775,7 @@
 </p:sld>
 </file>
 
-<file path=ppt/slides/slide32.xml><?xml version="1.0" encoding="utf-8"?>
+<file path=ppt/slides/slide31.xml><?xml version="1.0" encoding="utf-8"?>
 <p:sld xmlns:a="http://schemas.openxmlformats.org/drawingml/2006/main" xmlns:r="http://schemas.openxmlformats.org/officeDocument/2006/relationships" xmlns:p="http://schemas.openxmlformats.org/presentationml/2006/main">
   <p:cSld>
     <p:spTree>

</xml_diff>